<commit_message>
Added a chapter on text analysis
</commit_message>
<xml_diff>
--- a/ex2/ex2.pptx
+++ b/ex2/ex2.pptx
@@ -5,7 +5,7 @@
     <p:sldMasterId id="2147483648" r:id="rId1"/>
   </p:sldMasterIdLst>
   <p:notesMasterIdLst>
-    <p:notesMasterId r:id="rId26"/>
+    <p:notesMasterId r:id="rId25"/>
   </p:notesMasterIdLst>
   <p:sldIdLst>
     <p:sldId id="256" r:id="rId2"/>
@@ -25,13 +25,12 @@
     <p:sldId id="259" r:id="rId16"/>
     <p:sldId id="274" r:id="rId17"/>
     <p:sldId id="287" r:id="rId18"/>
-    <p:sldId id="289" r:id="rId19"/>
+    <p:sldId id="294" r:id="rId19"/>
     <p:sldId id="295" r:id="rId20"/>
-    <p:sldId id="294" r:id="rId21"/>
+    <p:sldId id="289" r:id="rId21"/>
     <p:sldId id="305" r:id="rId22"/>
     <p:sldId id="306" r:id="rId23"/>
     <p:sldId id="307" r:id="rId24"/>
-    <p:sldId id="308" r:id="rId25"/>
   </p:sldIdLst>
   <p:sldSz cx="12192000" cy="6858000"/>
   <p:notesSz cx="6400800" cy="8686800"/>
@@ -289,17 +288,17 @@
           <a:effectLst/>
           <a:extLst>
             <a:ext uri="{FAA26D3D-D897-4be2-8F04-BA451C77F1D7}">
-              <ma14:placeholderFlag xmlns="" xmlns:ma14="http://schemas.microsoft.com/office/mac/drawingml/2011/main" val="1"/>
+              <ma14:placeholderFlag xmlns:ma14="http://schemas.microsoft.com/office/mac/drawingml/2011/main" xmlns="" val="1"/>
             </a:ext>
             <a:ext uri="{909E8E84-426E-40dd-AFC4-6F175D3DCCD1}">
-              <a14:hiddenFill xmlns:a14="http://schemas.microsoft.com/office/drawing/2010/main" xmlns="">
+              <a14:hiddenFill xmlns="" xmlns:a14="http://schemas.microsoft.com/office/drawing/2010/main">
                 <a:solidFill>
                   <a:schemeClr val="accent1"/>
                 </a:solidFill>
               </a14:hiddenFill>
             </a:ext>
             <a:ext uri="{91240B29-F687-4f45-9708-019B960494DF}">
-              <a14:hiddenLine xmlns:a14="http://schemas.microsoft.com/office/drawing/2010/main" xmlns="" w="9525">
+              <a14:hiddenLine xmlns="" xmlns:a14="http://schemas.microsoft.com/office/drawing/2010/main" w="9525">
                 <a:solidFill>
                   <a:schemeClr val="tx1"/>
                 </a:solidFill>
@@ -309,7 +308,7 @@
               </a14:hiddenLine>
             </a:ext>
             <a:ext uri="{AF507438-7753-43e0-B8FC-AC1667EBCBE1}">
-              <a14:hiddenEffects xmlns:a14="http://schemas.microsoft.com/office/drawing/2010/main" xmlns="">
+              <a14:hiddenEffects xmlns="" xmlns:a14="http://schemas.microsoft.com/office/drawing/2010/main">
                 <a:effectLst>
                   <a:outerShdw blurRad="63500" dist="38099" dir="2700000" algn="ctr" rotWithShape="0">
                     <a:schemeClr val="bg2">
@@ -362,17 +361,17 @@
           <a:effectLst/>
           <a:extLst>
             <a:ext uri="{FAA26D3D-D897-4be2-8F04-BA451C77F1D7}">
-              <ma14:placeholderFlag xmlns="" xmlns:ma14="http://schemas.microsoft.com/office/mac/drawingml/2011/main" val="1"/>
+              <ma14:placeholderFlag xmlns:ma14="http://schemas.microsoft.com/office/mac/drawingml/2011/main" xmlns="" val="1"/>
             </a:ext>
             <a:ext uri="{909E8E84-426E-40dd-AFC4-6F175D3DCCD1}">
-              <a14:hiddenFill xmlns:a14="http://schemas.microsoft.com/office/drawing/2010/main" xmlns="">
+              <a14:hiddenFill xmlns="" xmlns:a14="http://schemas.microsoft.com/office/drawing/2010/main">
                 <a:solidFill>
                   <a:schemeClr val="accent1"/>
                 </a:solidFill>
               </a14:hiddenFill>
             </a:ext>
             <a:ext uri="{91240B29-F687-4f45-9708-019B960494DF}">
-              <a14:hiddenLine xmlns:a14="http://schemas.microsoft.com/office/drawing/2010/main" xmlns="" w="9525">
+              <a14:hiddenLine xmlns="" xmlns:a14="http://schemas.microsoft.com/office/drawing/2010/main" w="9525">
                 <a:solidFill>
                   <a:schemeClr val="tx1"/>
                 </a:solidFill>
@@ -382,7 +381,7 @@
               </a14:hiddenLine>
             </a:ext>
             <a:ext uri="{AF507438-7753-43e0-B8FC-AC1667EBCBE1}">
-              <a14:hiddenEffects xmlns:a14="http://schemas.microsoft.com/office/drawing/2010/main" xmlns="">
+              <a14:hiddenEffects xmlns="" xmlns:a14="http://schemas.microsoft.com/office/drawing/2010/main">
                 <a:effectLst>
                   <a:outerShdw blurRad="63500" dist="38099" dir="2700000" algn="ctr" rotWithShape="0">
                     <a:schemeClr val="bg2">
@@ -440,7 +439,7 @@
           <a:effectLst/>
           <a:extLst>
             <a:ext uri="{AF507438-7753-43e0-B8FC-AC1667EBCBE1}">
-              <a14:hiddenEffects xmlns:a14="http://schemas.microsoft.com/office/drawing/2010/main" xmlns="">
+              <a14:hiddenEffects xmlns="" xmlns:a14="http://schemas.microsoft.com/office/drawing/2010/main">
                 <a:effectLst>
                   <a:outerShdw blurRad="63500" dist="38099" dir="2700000" algn="ctr" rotWithShape="0">
                     <a:srgbClr val="000000">
@@ -451,7 +450,7 @@
               </a14:hiddenEffects>
             </a:ext>
             <a:ext uri="{53640926-AAD7-44d8-BBD7-CCE9431645EC}">
-              <a14:shadowObscured xmlns:a14="http://schemas.microsoft.com/office/drawing/2010/main" xmlns="" val="1"/>
+              <a14:shadowObscured xmlns="" xmlns:a14="http://schemas.microsoft.com/office/drawing/2010/main" val="1"/>
             </a:ext>
           </a:extLst>
         </p:spPr>
@@ -481,17 +480,17 @@
           <a:effectLst/>
           <a:extLst>
             <a:ext uri="{FAA26D3D-D897-4be2-8F04-BA451C77F1D7}">
-              <ma14:placeholderFlag xmlns="" xmlns:ma14="http://schemas.microsoft.com/office/mac/drawingml/2011/main" val="1"/>
+              <ma14:placeholderFlag xmlns:ma14="http://schemas.microsoft.com/office/mac/drawingml/2011/main" xmlns="" val="1"/>
             </a:ext>
             <a:ext uri="{909E8E84-426E-40dd-AFC4-6F175D3DCCD1}">
-              <a14:hiddenFill xmlns:a14="http://schemas.microsoft.com/office/drawing/2010/main" xmlns="">
+              <a14:hiddenFill xmlns="" xmlns:a14="http://schemas.microsoft.com/office/drawing/2010/main">
                 <a:solidFill>
                   <a:schemeClr val="accent1"/>
                 </a:solidFill>
               </a14:hiddenFill>
             </a:ext>
             <a:ext uri="{91240B29-F687-4f45-9708-019B960494DF}">
-              <a14:hiddenLine xmlns:a14="http://schemas.microsoft.com/office/drawing/2010/main" xmlns="" w="9525">
+              <a14:hiddenLine xmlns="" xmlns:a14="http://schemas.microsoft.com/office/drawing/2010/main" w="9525">
                 <a:solidFill>
                   <a:schemeClr val="tx1"/>
                 </a:solidFill>
@@ -501,7 +500,7 @@
               </a14:hiddenLine>
             </a:ext>
             <a:ext uri="{AF507438-7753-43e0-B8FC-AC1667EBCBE1}">
-              <a14:hiddenEffects xmlns:a14="http://schemas.microsoft.com/office/drawing/2010/main" xmlns="">
+              <a14:hiddenEffects xmlns="" xmlns:a14="http://schemas.microsoft.com/office/drawing/2010/main">
                 <a:effectLst>
                   <a:outerShdw blurRad="63500" dist="38099" dir="2700000" algn="ctr" rotWithShape="0">
                     <a:schemeClr val="bg2">
@@ -582,17 +581,17 @@
           <a:effectLst/>
           <a:extLst>
             <a:ext uri="{FAA26D3D-D897-4be2-8F04-BA451C77F1D7}">
-              <ma14:placeholderFlag xmlns="" xmlns:ma14="http://schemas.microsoft.com/office/mac/drawingml/2011/main" val="1"/>
+              <ma14:placeholderFlag xmlns:ma14="http://schemas.microsoft.com/office/mac/drawingml/2011/main" xmlns="" val="1"/>
             </a:ext>
             <a:ext uri="{909E8E84-426E-40dd-AFC4-6F175D3DCCD1}">
-              <a14:hiddenFill xmlns:a14="http://schemas.microsoft.com/office/drawing/2010/main" xmlns="">
+              <a14:hiddenFill xmlns="" xmlns:a14="http://schemas.microsoft.com/office/drawing/2010/main">
                 <a:solidFill>
                   <a:schemeClr val="accent1"/>
                 </a:solidFill>
               </a14:hiddenFill>
             </a:ext>
             <a:ext uri="{91240B29-F687-4f45-9708-019B960494DF}">
-              <a14:hiddenLine xmlns:a14="http://schemas.microsoft.com/office/drawing/2010/main" xmlns="" w="9525">
+              <a14:hiddenLine xmlns="" xmlns:a14="http://schemas.microsoft.com/office/drawing/2010/main" w="9525">
                 <a:solidFill>
                   <a:schemeClr val="tx1"/>
                 </a:solidFill>
@@ -602,7 +601,7 @@
               </a14:hiddenLine>
             </a:ext>
             <a:ext uri="{AF507438-7753-43e0-B8FC-AC1667EBCBE1}">
-              <a14:hiddenEffects xmlns:a14="http://schemas.microsoft.com/office/drawing/2010/main" xmlns="">
+              <a14:hiddenEffects xmlns="" xmlns:a14="http://schemas.microsoft.com/office/drawing/2010/main">
                 <a:effectLst>
                   <a:outerShdw blurRad="63500" dist="38099" dir="2700000" algn="ctr" rotWithShape="0">
                     <a:schemeClr val="bg2">
@@ -655,17 +654,17 @@
           <a:effectLst/>
           <a:extLst>
             <a:ext uri="{FAA26D3D-D897-4be2-8F04-BA451C77F1D7}">
-              <ma14:placeholderFlag xmlns="" xmlns:ma14="http://schemas.microsoft.com/office/mac/drawingml/2011/main" val="1"/>
+              <ma14:placeholderFlag xmlns:ma14="http://schemas.microsoft.com/office/mac/drawingml/2011/main" xmlns="" val="1"/>
             </a:ext>
             <a:ext uri="{909E8E84-426E-40dd-AFC4-6F175D3DCCD1}">
-              <a14:hiddenFill xmlns:a14="http://schemas.microsoft.com/office/drawing/2010/main" xmlns="">
+              <a14:hiddenFill xmlns="" xmlns:a14="http://schemas.microsoft.com/office/drawing/2010/main">
                 <a:solidFill>
                   <a:schemeClr val="accent1"/>
                 </a:solidFill>
               </a14:hiddenFill>
             </a:ext>
             <a:ext uri="{91240B29-F687-4f45-9708-019B960494DF}">
-              <a14:hiddenLine xmlns:a14="http://schemas.microsoft.com/office/drawing/2010/main" xmlns="" w="9525">
+              <a14:hiddenLine xmlns="" xmlns:a14="http://schemas.microsoft.com/office/drawing/2010/main" w="9525">
                 <a:solidFill>
                   <a:schemeClr val="tx1"/>
                 </a:solidFill>
@@ -675,7 +674,7 @@
               </a14:hiddenLine>
             </a:ext>
             <a:ext uri="{AF507438-7753-43e0-B8FC-AC1667EBCBE1}">
-              <a14:hiddenEffects xmlns:a14="http://schemas.microsoft.com/office/drawing/2010/main" xmlns="">
+              <a14:hiddenEffects xmlns="" xmlns:a14="http://schemas.microsoft.com/office/drawing/2010/main">
                 <a:effectLst>
                   <a:outerShdw blurRad="63500" dist="38099" dir="2700000" algn="ctr" rotWithShape="0">
                     <a:schemeClr val="bg2">
@@ -1352,7 +1351,7 @@
           <a:effectLst/>
           <a:extLst>
             <a:ext uri="{AF507438-7753-43e0-B8FC-AC1667EBCBE1}">
-              <a14:hiddenEffects xmlns:a14="http://schemas.microsoft.com/office/drawing/2010/main" xmlns="">
+              <a14:hiddenEffects xmlns="" xmlns:a14="http://schemas.microsoft.com/office/drawing/2010/main">
                 <a:effectLst>
                   <a:outerShdw blurRad="63500" dist="35921" dir="2700000" algn="ctr" rotWithShape="0">
                     <a:schemeClr val="bg2"/>
@@ -2238,7 +2237,7 @@
           <a:noFill/>
           <a:extLst>
             <a:ext uri="{909E8E84-426E-40dd-AFC4-6F175D3DCCD1}">
-              <a14:hiddenFill xmlns:a14="http://schemas.microsoft.com/office/drawing/2010/main" xmlns="">
+              <a14:hiddenFill xmlns="" xmlns:a14="http://schemas.microsoft.com/office/drawing/2010/main">
                 <a:solidFill>
                   <a:srgbClr val="FFFFFF"/>
                 </a:solidFill>
@@ -2272,17 +2271,17 @@
           <a:effectLst/>
           <a:extLst>
             <a:ext uri="{FAA26D3D-D897-4be2-8F04-BA451C77F1D7}">
-              <ma14:placeholderFlag xmlns="" xmlns:ma14="http://schemas.microsoft.com/office/mac/drawingml/2011/main" val="1"/>
+              <ma14:placeholderFlag xmlns:ma14="http://schemas.microsoft.com/office/mac/drawingml/2011/main" xmlns="" val="1"/>
             </a:ext>
             <a:ext uri="{909E8E84-426E-40dd-AFC4-6F175D3DCCD1}">
-              <a14:hiddenFill xmlns:a14="http://schemas.microsoft.com/office/drawing/2010/main" xmlns="">
+              <a14:hiddenFill xmlns="" xmlns:a14="http://schemas.microsoft.com/office/drawing/2010/main">
                 <a:solidFill>
                   <a:schemeClr val="accent1"/>
                 </a:solidFill>
               </a14:hiddenFill>
             </a:ext>
             <a:ext uri="{91240B29-F687-4f45-9708-019B960494DF}">
-              <a14:hiddenLine xmlns:a14="http://schemas.microsoft.com/office/drawing/2010/main" xmlns="" w="9525">
+              <a14:hiddenLine xmlns="" xmlns:a14="http://schemas.microsoft.com/office/drawing/2010/main" w="9525">
                 <a:solidFill>
                   <a:schemeClr val="tx1"/>
                 </a:solidFill>
@@ -2292,7 +2291,7 @@
               </a14:hiddenLine>
             </a:ext>
             <a:ext uri="{AF507438-7753-43e0-B8FC-AC1667EBCBE1}">
-              <a14:hiddenEffects xmlns:a14="http://schemas.microsoft.com/office/drawing/2010/main" xmlns="">
+              <a14:hiddenEffects xmlns="" xmlns:a14="http://schemas.microsoft.com/office/drawing/2010/main">
                 <a:effectLst>
                   <a:outerShdw blurRad="63500" dist="38099" dir="2700000" algn="ctr" rotWithShape="0">
                     <a:schemeClr val="bg2">
@@ -2354,17 +2353,17 @@
           <a:effectLst/>
           <a:extLst>
             <a:ext uri="{FAA26D3D-D897-4be2-8F04-BA451C77F1D7}">
-              <ma14:placeholderFlag xmlns="" xmlns:ma14="http://schemas.microsoft.com/office/mac/drawingml/2011/main" val="1"/>
+              <ma14:placeholderFlag xmlns:ma14="http://schemas.microsoft.com/office/mac/drawingml/2011/main" xmlns="" val="1"/>
             </a:ext>
             <a:ext uri="{909E8E84-426E-40dd-AFC4-6F175D3DCCD1}">
-              <a14:hiddenFill xmlns:a14="http://schemas.microsoft.com/office/drawing/2010/main" xmlns="">
+              <a14:hiddenFill xmlns="" xmlns:a14="http://schemas.microsoft.com/office/drawing/2010/main">
                 <a:solidFill>
                   <a:schemeClr val="accent1"/>
                 </a:solidFill>
               </a14:hiddenFill>
             </a:ext>
             <a:ext uri="{91240B29-F687-4f45-9708-019B960494DF}">
-              <a14:hiddenLine xmlns:a14="http://schemas.microsoft.com/office/drawing/2010/main" xmlns="" w="9525">
+              <a14:hiddenLine xmlns="" xmlns:a14="http://schemas.microsoft.com/office/drawing/2010/main" w="9525">
                 <a:solidFill>
                   <a:schemeClr val="tx1"/>
                 </a:solidFill>
@@ -2374,7 +2373,7 @@
               </a14:hiddenLine>
             </a:ext>
             <a:ext uri="{AF507438-7753-43e0-B8FC-AC1667EBCBE1}">
-              <a14:hiddenEffects xmlns:a14="http://schemas.microsoft.com/office/drawing/2010/main" xmlns="">
+              <a14:hiddenEffects xmlns="" xmlns:a14="http://schemas.microsoft.com/office/drawing/2010/main">
                 <a:effectLst>
                   <a:outerShdw blurRad="63500" dist="38099" dir="2700000" algn="ctr" rotWithShape="0">
                     <a:schemeClr val="bg2">
@@ -2500,17 +2499,17 @@
           <a:effectLst/>
           <a:extLst>
             <a:ext uri="{FAA26D3D-D897-4be2-8F04-BA451C77F1D7}">
-              <ma14:placeholderFlag xmlns="" xmlns:ma14="http://schemas.microsoft.com/office/mac/drawingml/2011/main" val="1"/>
+              <ma14:placeholderFlag xmlns:ma14="http://schemas.microsoft.com/office/mac/drawingml/2011/main" xmlns="" val="1"/>
             </a:ext>
             <a:ext uri="{909E8E84-426E-40dd-AFC4-6F175D3DCCD1}">
-              <a14:hiddenFill xmlns:a14="http://schemas.microsoft.com/office/drawing/2010/main" xmlns="">
+              <a14:hiddenFill xmlns="" xmlns:a14="http://schemas.microsoft.com/office/drawing/2010/main">
                 <a:solidFill>
                   <a:schemeClr val="accent1"/>
                 </a:solidFill>
               </a14:hiddenFill>
             </a:ext>
             <a:ext uri="{91240B29-F687-4f45-9708-019B960494DF}">
-              <a14:hiddenLine xmlns:a14="http://schemas.microsoft.com/office/drawing/2010/main" xmlns="" w="9525">
+              <a14:hiddenLine xmlns="" xmlns:a14="http://schemas.microsoft.com/office/drawing/2010/main" w="9525">
                 <a:solidFill>
                   <a:schemeClr val="tx1"/>
                 </a:solidFill>
@@ -2520,7 +2519,7 @@
               </a14:hiddenLine>
             </a:ext>
             <a:ext uri="{AF507438-7753-43e0-B8FC-AC1667EBCBE1}">
-              <a14:hiddenEffects xmlns:a14="http://schemas.microsoft.com/office/drawing/2010/main" xmlns="">
+              <a14:hiddenEffects xmlns="" xmlns:a14="http://schemas.microsoft.com/office/drawing/2010/main">
                 <a:effectLst>
                   <a:outerShdw blurRad="63500" dist="38099" dir="2700000" algn="ctr" rotWithShape="0">
                     <a:schemeClr val="bg2">
@@ -2577,17 +2576,17 @@
           <a:effectLst/>
           <a:extLst>
             <a:ext uri="{FAA26D3D-D897-4be2-8F04-BA451C77F1D7}">
-              <ma14:placeholderFlag xmlns="" xmlns:ma14="http://schemas.microsoft.com/office/mac/drawingml/2011/main" val="1"/>
+              <ma14:placeholderFlag xmlns:ma14="http://schemas.microsoft.com/office/mac/drawingml/2011/main" xmlns="" val="1"/>
             </a:ext>
             <a:ext uri="{909E8E84-426E-40dd-AFC4-6F175D3DCCD1}">
-              <a14:hiddenFill xmlns:a14="http://schemas.microsoft.com/office/drawing/2010/main" xmlns="">
+              <a14:hiddenFill xmlns="" xmlns:a14="http://schemas.microsoft.com/office/drawing/2010/main">
                 <a:solidFill>
                   <a:schemeClr val="accent1"/>
                 </a:solidFill>
               </a14:hiddenFill>
             </a:ext>
             <a:ext uri="{91240B29-F687-4f45-9708-019B960494DF}">
-              <a14:hiddenLine xmlns:a14="http://schemas.microsoft.com/office/drawing/2010/main" xmlns="" w="9525">
+              <a14:hiddenLine xmlns="" xmlns:a14="http://schemas.microsoft.com/office/drawing/2010/main" w="9525">
                 <a:solidFill>
                   <a:schemeClr val="tx1"/>
                 </a:solidFill>
@@ -2597,7 +2596,7 @@
               </a14:hiddenLine>
             </a:ext>
             <a:ext uri="{AF507438-7753-43e0-B8FC-AC1667EBCBE1}">
-              <a14:hiddenEffects xmlns:a14="http://schemas.microsoft.com/office/drawing/2010/main" xmlns="">
+              <a14:hiddenEffects xmlns="" xmlns:a14="http://schemas.microsoft.com/office/drawing/2010/main">
                 <a:effectLst>
                   <a:outerShdw blurRad="63500" dist="38099" dir="2700000" algn="ctr" rotWithShape="0">
                     <a:schemeClr val="bg2">
@@ -2654,17 +2653,17 @@
           <a:effectLst/>
           <a:extLst>
             <a:ext uri="{FAA26D3D-D897-4be2-8F04-BA451C77F1D7}">
-              <ma14:placeholderFlag xmlns="" xmlns:ma14="http://schemas.microsoft.com/office/mac/drawingml/2011/main" val="1"/>
+              <ma14:placeholderFlag xmlns:ma14="http://schemas.microsoft.com/office/mac/drawingml/2011/main" xmlns="" val="1"/>
             </a:ext>
             <a:ext uri="{909E8E84-426E-40dd-AFC4-6F175D3DCCD1}">
-              <a14:hiddenFill xmlns:a14="http://schemas.microsoft.com/office/drawing/2010/main" xmlns="">
+              <a14:hiddenFill xmlns="" xmlns:a14="http://schemas.microsoft.com/office/drawing/2010/main">
                 <a:solidFill>
                   <a:schemeClr val="accent1"/>
                 </a:solidFill>
               </a14:hiddenFill>
             </a:ext>
             <a:ext uri="{91240B29-F687-4f45-9708-019B960494DF}">
-              <a14:hiddenLine xmlns:a14="http://schemas.microsoft.com/office/drawing/2010/main" xmlns="" w="9525">
+              <a14:hiddenLine xmlns="" xmlns:a14="http://schemas.microsoft.com/office/drawing/2010/main" w="9525">
                 <a:solidFill>
                   <a:schemeClr val="tx1"/>
                 </a:solidFill>
@@ -2674,7 +2673,7 @@
               </a14:hiddenLine>
             </a:ext>
             <a:ext uri="{AF507438-7753-43e0-B8FC-AC1667EBCBE1}">
-              <a14:hiddenEffects xmlns:a14="http://schemas.microsoft.com/office/drawing/2010/main" xmlns="">
+              <a14:hiddenEffects xmlns="" xmlns:a14="http://schemas.microsoft.com/office/drawing/2010/main">
                 <a:effectLst>
                   <a:outerShdw blurRad="63500" dist="38099" dir="2700000" algn="ctr" rotWithShape="0">
                     <a:schemeClr val="bg2">
@@ -2739,12 +2738,12 @@
           <a:effectLst/>
           <a:extLst>
             <a:ext uri="{909E8E84-426E-40dd-AFC4-6F175D3DCCD1}">
-              <a14:hiddenFill xmlns:a14="http://schemas.microsoft.com/office/drawing/2010/main" xmlns="">
+              <a14:hiddenFill xmlns="" xmlns:a14="http://schemas.microsoft.com/office/drawing/2010/main">
                 <a:noFill/>
               </a14:hiddenFill>
             </a:ext>
             <a:ext uri="{AF507438-7753-43e0-B8FC-AC1667EBCBE1}">
-              <a14:hiddenEffects xmlns:a14="http://schemas.microsoft.com/office/drawing/2010/main" xmlns="">
+              <a14:hiddenEffects xmlns="" xmlns:a14="http://schemas.microsoft.com/office/drawing/2010/main">
                 <a:effectLst>
                   <a:outerShdw blurRad="63500" dist="38099" dir="2700000" algn="ctr" rotWithShape="0">
                     <a:schemeClr val="bg2">
@@ -2787,14 +2786,14 @@
           <a:effectLst/>
           <a:extLst>
             <a:ext uri="{909E8E84-426E-40dd-AFC4-6F175D3DCCD1}">
-              <a14:hiddenFill xmlns:a14="http://schemas.microsoft.com/office/drawing/2010/main" xmlns="">
+              <a14:hiddenFill xmlns="" xmlns:a14="http://schemas.microsoft.com/office/drawing/2010/main">
                 <a:solidFill>
                   <a:schemeClr val="accent1"/>
                 </a:solidFill>
               </a14:hiddenFill>
             </a:ext>
             <a:ext uri="{91240B29-F687-4f45-9708-019B960494DF}">
-              <a14:hiddenLine xmlns:a14="http://schemas.microsoft.com/office/drawing/2010/main" xmlns="" w="9525">
+              <a14:hiddenLine xmlns="" xmlns:a14="http://schemas.microsoft.com/office/drawing/2010/main" w="9525">
                 <a:solidFill>
                   <a:schemeClr val="tx1"/>
                 </a:solidFill>
@@ -2804,7 +2803,7 @@
               </a14:hiddenLine>
             </a:ext>
             <a:ext uri="{AF507438-7753-43e0-B8FC-AC1667EBCBE1}">
-              <a14:hiddenEffects xmlns:a14="http://schemas.microsoft.com/office/drawing/2010/main" xmlns="">
+              <a14:hiddenEffects xmlns="" xmlns:a14="http://schemas.microsoft.com/office/drawing/2010/main">
                 <a:effectLst>
                   <a:outerShdw blurRad="63500" dist="38099" dir="2700000" algn="ctr" rotWithShape="0">
                     <a:schemeClr val="bg2">
@@ -6930,32 +6929,35 @@
           <a:p>
             <a:pPr lvl="1"/>
             <a:r>
+              <a:rPr lang="en-US" dirty="0">
+                <a:solidFill>
+                  <a:schemeClr val="bg1">
+                    <a:lumMod val="75000"/>
+                  </a:schemeClr>
+                </a:solidFill>
+              </a:rPr>
+              <a:t>Grouping</a:t>
+            </a:r>
+          </a:p>
+          <a:p>
+            <a:pPr lvl="1"/>
+            <a:r>
+              <a:rPr lang="en-US" dirty="0">
+                <a:solidFill>
+                  <a:schemeClr val="bg1">
+                    <a:lumMod val="75000"/>
+                  </a:schemeClr>
+                </a:solidFill>
+              </a:rPr>
+              <a:t>Anchors</a:t>
+            </a:r>
+          </a:p>
+          <a:p>
+            <a:pPr lvl="1"/>
+            <a:r>
               <a:rPr lang="en-US" dirty="0"/>
-              <a:t>Grouping</a:t>
-            </a:r>
-          </a:p>
-          <a:p>
-            <a:pPr lvl="1"/>
-            <a:r>
-              <a:rPr lang="en-US" dirty="0">
-                <a:solidFill>
-                  <a:srgbClr val="A3ADB7"/>
-                </a:solidFill>
-              </a:rPr>
-              <a:t>Anchors</a:t>
-            </a:r>
-          </a:p>
-          <a:p>
-            <a:pPr lvl="1"/>
-            <a:r>
-              <a:rPr lang="en-US" dirty="0">
-                <a:solidFill>
-                  <a:srgbClr val="A3ADB7"/>
-                </a:solidFill>
-              </a:rPr>
               <a:t>Repetition</a:t>
             </a:r>
-            <a:endParaRPr lang="en-US" dirty="0"/>
           </a:p>
           <a:p>
             <a:pPr lvl="1"/>
@@ -7106,7 +7108,7 @@
         <p:spPr>
           <a:xfrm>
             <a:off x="5159896" y="2348880"/>
-            <a:ext cx="7200800" cy="1661993"/>
+            <a:ext cx="3744416" cy="2446824"/>
           </a:xfrm>
           <a:prstGeom prst="rect">
             <a:avLst/>
@@ -7120,267 +7122,133 @@
           <a:lstStyle/>
           <a:p>
             <a:r>
-              <a:rPr lang="en-US" dirty="0"/>
-              <a:t>Parentheses define a group</a:t>
-            </a:r>
+              <a:rPr lang="en-US" dirty="0">
+                <a:latin typeface="+mj-lt"/>
+                <a:cs typeface="Consolas" panose="020B0609020204030204" pitchFamily="49" charset="0"/>
+              </a:rPr>
+              <a:t>Signs after an expression indicate how often it should or may appear.</a:t>
+            </a:r>
+          </a:p>
+          <a:p>
+            <a:endParaRPr lang="en-US" dirty="0">
+              <a:latin typeface="Consolas" panose="020B0609020204030204" pitchFamily="49" charset="0"/>
+              <a:cs typeface="Consolas" panose="020B0609020204030204" pitchFamily="49" charset="0"/>
+            </a:endParaRPr>
           </a:p>
           <a:p>
             <a:pPr marL="285750" indent="-285750">
               <a:buFontTx/>
               <a:buChar char="-"/>
             </a:pPr>
-            <a:endParaRPr lang="en-US" dirty="0"/>
-          </a:p>
-          <a:p>
-            <a:r>
-              <a:rPr lang="en-US" dirty="0">
-                <a:solidFill>
-                  <a:srgbClr val="3353B7"/>
-                </a:solidFill>
-                <a:latin typeface="Consolas" panose="020B0609020204030204" pitchFamily="49" charset="0"/>
-                <a:cs typeface="Consolas" panose="020B0609020204030204" pitchFamily="49" charset="0"/>
-              </a:rPr>
-              <a:t>&gt; </a:t>
+            <a:r>
+              <a:rPr lang="en-US" dirty="0">
+                <a:latin typeface="Consolas" panose="020B0609020204030204" pitchFamily="49" charset="0"/>
+                <a:cs typeface="Consolas" panose="020B0609020204030204" pitchFamily="49" charset="0"/>
+              </a:rPr>
+              <a:t>?</a:t>
+            </a:r>
+            <a:r>
+              <a:rPr lang="en-US" dirty="0"/>
+              <a:t>:		 0 or 1.</a:t>
+            </a:r>
+          </a:p>
+          <a:p>
+            <a:pPr marL="285750" indent="-285750">
+              <a:buFontTx/>
+              <a:buChar char="-"/>
+            </a:pPr>
+            <a:r>
+              <a:rPr lang="en-US" dirty="0">
+                <a:latin typeface="Consolas" panose="020B0609020204030204" pitchFamily="49" charset="0"/>
+                <a:cs typeface="Consolas" panose="020B0609020204030204" pitchFamily="49" charset="0"/>
+              </a:rPr>
+              <a:t>+</a:t>
+            </a:r>
+            <a:r>
+              <a:rPr lang="en-US" dirty="0"/>
+              <a:t>: 		1 or more.</a:t>
+            </a:r>
+          </a:p>
+          <a:p>
+            <a:pPr marL="285750" indent="-285750">
+              <a:buFontTx/>
+              <a:buChar char="-"/>
+            </a:pPr>
+            <a:r>
+              <a:rPr lang="en-US" dirty="0">
+                <a:latin typeface="Consolas" panose="020B0609020204030204" pitchFamily="49" charset="0"/>
+                <a:cs typeface="Consolas" panose="020B0609020204030204" pitchFamily="49" charset="0"/>
+              </a:rPr>
+              <a:t>*</a:t>
+            </a:r>
+            <a:r>
+              <a:rPr lang="en-US" dirty="0"/>
+              <a:t>: 		0 or more.</a:t>
+            </a:r>
+          </a:p>
+          <a:p>
+            <a:pPr marL="285750" indent="-285750">
+              <a:buFontTx/>
+              <a:buChar char="-"/>
+            </a:pPr>
+            <a:r>
+              <a:rPr lang="en-US" dirty="0">
+                <a:latin typeface="Consolas" panose="020B0609020204030204" pitchFamily="49" charset="0"/>
+                <a:cs typeface="Consolas" panose="020B0609020204030204" pitchFamily="49" charset="0"/>
+              </a:rPr>
+              <a:t>{n}</a:t>
+            </a:r>
+            <a:r>
+              <a:rPr lang="en-US" dirty="0"/>
+              <a:t>: 		exactly n</a:t>
+            </a:r>
+          </a:p>
+          <a:p>
+            <a:pPr marL="285750" indent="-285750">
+              <a:buFontTx/>
+              <a:buChar char="-"/>
+            </a:pPr>
+            <a:r>
+              <a:rPr lang="en-US" dirty="0">
+                <a:latin typeface="Consolas" panose="020B0609020204030204" pitchFamily="49" charset="0"/>
+                <a:cs typeface="Consolas" panose="020B0609020204030204" pitchFamily="49" charset="0"/>
+              </a:rPr>
+              <a:t>{n,}</a:t>
+            </a:r>
+            <a:r>
+              <a:rPr lang="en-US" dirty="0"/>
+              <a:t>: 		n or more</a:t>
+            </a:r>
+          </a:p>
+          <a:p>
+            <a:pPr marL="285750" indent="-285750">
+              <a:buFontTx/>
+              <a:buChar char="-"/>
+            </a:pPr>
+            <a:r>
+              <a:rPr lang="en-US" dirty="0">
+                <a:latin typeface="Consolas" panose="020B0609020204030204" pitchFamily="49" charset="0"/>
+                <a:cs typeface="Consolas" panose="020B0609020204030204" pitchFamily="49" charset="0"/>
+              </a:rPr>
+              <a:t>{</a:t>
             </a:r>
             <a:r>
               <a:rPr lang="en-US" dirty="0" err="1">
-                <a:solidFill>
-                  <a:srgbClr val="3353B7"/>
-                </a:solidFill>
-                <a:latin typeface="Consolas" panose="020B0609020204030204" pitchFamily="49" charset="0"/>
-                <a:cs typeface="Consolas" panose="020B0609020204030204" pitchFamily="49" charset="0"/>
-              </a:rPr>
-              <a:t>str_extract</a:t>
-            </a:r>
-            <a:r>
-              <a:rPr lang="en-US" dirty="0">
-                <a:solidFill>
-                  <a:srgbClr val="3353B7"/>
-                </a:solidFill>
-                <a:latin typeface="Consolas" panose="020B0609020204030204" pitchFamily="49" charset="0"/>
-                <a:cs typeface="Consolas" panose="020B0609020204030204" pitchFamily="49" charset="0"/>
-              </a:rPr>
-              <a:t>(c("</a:t>
-            </a:r>
-            <a:r>
-              <a:rPr lang="en-US" dirty="0">
-                <a:solidFill>
-                  <a:schemeClr val="accent6">
-                    <a:lumMod val="50000"/>
-                  </a:schemeClr>
-                </a:solidFill>
-                <a:latin typeface="Consolas" panose="020B0609020204030204" pitchFamily="49" charset="0"/>
-                <a:cs typeface="Consolas" panose="020B0609020204030204" pitchFamily="49" charset="0"/>
-              </a:rPr>
-              <a:t>grey</a:t>
-            </a:r>
-            <a:r>
-              <a:rPr lang="en-US" dirty="0">
-                <a:solidFill>
-                  <a:srgbClr val="3353B7"/>
-                </a:solidFill>
-                <a:latin typeface="Consolas" panose="020B0609020204030204" pitchFamily="49" charset="0"/>
-                <a:cs typeface="Consolas" panose="020B0609020204030204" pitchFamily="49" charset="0"/>
-              </a:rPr>
-              <a:t>", "</a:t>
-            </a:r>
-            <a:r>
-              <a:rPr lang="en-US" dirty="0">
-                <a:solidFill>
-                  <a:schemeClr val="accent6">
-                    <a:lumMod val="50000"/>
-                  </a:schemeClr>
-                </a:solidFill>
-                <a:latin typeface="Consolas" panose="020B0609020204030204" pitchFamily="49" charset="0"/>
-                <a:cs typeface="Consolas" panose="020B0609020204030204" pitchFamily="49" charset="0"/>
-              </a:rPr>
-              <a:t>gray</a:t>
-            </a:r>
-            <a:r>
-              <a:rPr lang="en-US" dirty="0">
-                <a:solidFill>
-                  <a:srgbClr val="3353B7"/>
-                </a:solidFill>
-                <a:latin typeface="Consolas" panose="020B0609020204030204" pitchFamily="49" charset="0"/>
-                <a:cs typeface="Consolas" panose="020B0609020204030204" pitchFamily="49" charset="0"/>
-              </a:rPr>
-              <a:t>"), "</a:t>
-            </a:r>
-            <a:r>
-              <a:rPr lang="en-US" dirty="0" err="1">
-                <a:solidFill>
-                  <a:schemeClr val="accent6">
-                    <a:lumMod val="50000"/>
-                  </a:schemeClr>
-                </a:solidFill>
-                <a:latin typeface="Consolas" panose="020B0609020204030204" pitchFamily="49" charset="0"/>
-                <a:cs typeface="Consolas" panose="020B0609020204030204" pitchFamily="49" charset="0"/>
-              </a:rPr>
-              <a:t>gre|ay</a:t>
-            </a:r>
-            <a:r>
-              <a:rPr lang="en-US" dirty="0">
-                <a:solidFill>
-                  <a:srgbClr val="3353B7"/>
-                </a:solidFill>
-                <a:latin typeface="Consolas" panose="020B0609020204030204" pitchFamily="49" charset="0"/>
-                <a:cs typeface="Consolas" panose="020B0609020204030204" pitchFamily="49" charset="0"/>
-              </a:rPr>
-              <a:t>")</a:t>
-            </a:r>
-          </a:p>
-          <a:p>
-            <a:r>
-              <a:rPr lang="en-US" dirty="0">
-                <a:latin typeface="Consolas" panose="020B0609020204030204" pitchFamily="49" charset="0"/>
-                <a:cs typeface="Consolas" panose="020B0609020204030204" pitchFamily="49" charset="0"/>
-              </a:rPr>
-              <a:t>   "</a:t>
-            </a:r>
-            <a:r>
-              <a:rPr lang="en-US" dirty="0" err="1">
-                <a:latin typeface="Consolas" panose="020B0609020204030204" pitchFamily="49" charset="0"/>
-                <a:cs typeface="Consolas" panose="020B0609020204030204" pitchFamily="49" charset="0"/>
-              </a:rPr>
-              <a:t>gre</a:t>
-            </a:r>
-            <a:r>
-              <a:rPr lang="en-US" dirty="0">
-                <a:latin typeface="Consolas" panose="020B0609020204030204" pitchFamily="49" charset="0"/>
-                <a:cs typeface="Consolas" panose="020B0609020204030204" pitchFamily="49" charset="0"/>
-              </a:rPr>
-              <a:t>" "ay"</a:t>
-            </a:r>
-          </a:p>
-          <a:p>
-            <a:r>
-              <a:rPr lang="en-US" dirty="0">
-                <a:solidFill>
-                  <a:srgbClr val="3353B7"/>
-                </a:solidFill>
-                <a:latin typeface="Consolas" panose="020B0609020204030204" pitchFamily="49" charset="0"/>
-                <a:cs typeface="Consolas" panose="020B0609020204030204" pitchFamily="49" charset="0"/>
-              </a:rPr>
-              <a:t>&gt; </a:t>
-            </a:r>
-            <a:r>
-              <a:rPr lang="en-US" dirty="0" err="1">
-                <a:solidFill>
-                  <a:srgbClr val="3353B7"/>
-                </a:solidFill>
-                <a:latin typeface="Consolas" panose="020B0609020204030204" pitchFamily="49" charset="0"/>
-                <a:cs typeface="Consolas" panose="020B0609020204030204" pitchFamily="49" charset="0"/>
-              </a:rPr>
-              <a:t>str_extract</a:t>
-            </a:r>
-            <a:r>
-              <a:rPr lang="en-US" dirty="0">
-                <a:solidFill>
-                  <a:srgbClr val="3353B7"/>
-                </a:solidFill>
-                <a:latin typeface="Consolas" panose="020B0609020204030204" pitchFamily="49" charset="0"/>
-                <a:cs typeface="Consolas" panose="020B0609020204030204" pitchFamily="49" charset="0"/>
-              </a:rPr>
-              <a:t>(c("</a:t>
-            </a:r>
-            <a:r>
-              <a:rPr lang="en-US" dirty="0">
-                <a:solidFill>
-                  <a:schemeClr val="accent6">
-                    <a:lumMod val="50000"/>
-                  </a:schemeClr>
-                </a:solidFill>
-                <a:latin typeface="Consolas" panose="020B0609020204030204" pitchFamily="49" charset="0"/>
-                <a:cs typeface="Consolas" panose="020B0609020204030204" pitchFamily="49" charset="0"/>
-              </a:rPr>
-              <a:t>grey</a:t>
-            </a:r>
-            <a:r>
-              <a:rPr lang="en-US" dirty="0">
-                <a:solidFill>
-                  <a:srgbClr val="3353B7"/>
-                </a:solidFill>
-                <a:latin typeface="Consolas" panose="020B0609020204030204" pitchFamily="49" charset="0"/>
-                <a:cs typeface="Consolas" panose="020B0609020204030204" pitchFamily="49" charset="0"/>
-              </a:rPr>
-              <a:t>", "</a:t>
-            </a:r>
-            <a:r>
-              <a:rPr lang="en-US" dirty="0">
-                <a:solidFill>
-                  <a:schemeClr val="accent6">
-                    <a:lumMod val="50000"/>
-                  </a:schemeClr>
-                </a:solidFill>
-                <a:latin typeface="Consolas" panose="020B0609020204030204" pitchFamily="49" charset="0"/>
-                <a:cs typeface="Consolas" panose="020B0609020204030204" pitchFamily="49" charset="0"/>
-              </a:rPr>
-              <a:t>gray</a:t>
-            </a:r>
-            <a:r>
-              <a:rPr lang="en-US" dirty="0">
-                <a:solidFill>
-                  <a:srgbClr val="3353B7"/>
-                </a:solidFill>
-                <a:latin typeface="Consolas" panose="020B0609020204030204" pitchFamily="49" charset="0"/>
-                <a:cs typeface="Consolas" panose="020B0609020204030204" pitchFamily="49" charset="0"/>
-              </a:rPr>
-              <a:t>"), "</a:t>
-            </a:r>
-            <a:r>
-              <a:rPr lang="en-US" dirty="0">
-                <a:solidFill>
-                  <a:schemeClr val="accent6">
-                    <a:lumMod val="50000"/>
-                  </a:schemeClr>
-                </a:solidFill>
-                <a:latin typeface="Consolas" panose="020B0609020204030204" pitchFamily="49" charset="0"/>
-                <a:cs typeface="Consolas" panose="020B0609020204030204" pitchFamily="49" charset="0"/>
-              </a:rPr>
-              <a:t>gr(</a:t>
-            </a:r>
-            <a:r>
-              <a:rPr lang="en-US" dirty="0" err="1">
-                <a:solidFill>
-                  <a:schemeClr val="accent6">
-                    <a:lumMod val="50000"/>
-                  </a:schemeClr>
-                </a:solidFill>
-                <a:latin typeface="Consolas" panose="020B0609020204030204" pitchFamily="49" charset="0"/>
-                <a:cs typeface="Consolas" panose="020B0609020204030204" pitchFamily="49" charset="0"/>
-              </a:rPr>
-              <a:t>e|a</a:t>
-            </a:r>
-            <a:r>
-              <a:rPr lang="en-US" dirty="0">
-                <a:solidFill>
-                  <a:schemeClr val="accent6">
-                    <a:lumMod val="50000"/>
-                  </a:schemeClr>
-                </a:solidFill>
-                <a:latin typeface="Consolas" panose="020B0609020204030204" pitchFamily="49" charset="0"/>
-                <a:cs typeface="Consolas" panose="020B0609020204030204" pitchFamily="49" charset="0"/>
-              </a:rPr>
-              <a:t>)y</a:t>
-            </a:r>
-            <a:r>
-              <a:rPr lang="en-US" dirty="0">
-                <a:solidFill>
-                  <a:srgbClr val="3353B7"/>
-                </a:solidFill>
-                <a:latin typeface="Consolas" panose="020B0609020204030204" pitchFamily="49" charset="0"/>
-                <a:cs typeface="Consolas" panose="020B0609020204030204" pitchFamily="49" charset="0"/>
-              </a:rPr>
-              <a:t>")</a:t>
-            </a:r>
-          </a:p>
-          <a:p>
-            <a:r>
-              <a:rPr lang="en-US" dirty="0">
-                <a:latin typeface="Consolas" panose="020B0609020204030204" pitchFamily="49" charset="0"/>
-                <a:cs typeface="Consolas" panose="020B0609020204030204" pitchFamily="49" charset="0"/>
-              </a:rPr>
-              <a:t>   "grey" "gray"</a:t>
+                <a:latin typeface="Consolas" panose="020B0609020204030204" pitchFamily="49" charset="0"/>
+                <a:cs typeface="Consolas" panose="020B0609020204030204" pitchFamily="49" charset="0"/>
+              </a:rPr>
+              <a:t>n,m</a:t>
+            </a:r>
+            <a:r>
+              <a:rPr lang="en-US" dirty="0">
+                <a:latin typeface="Consolas" panose="020B0609020204030204" pitchFamily="49" charset="0"/>
+                <a:cs typeface="Consolas" panose="020B0609020204030204" pitchFamily="49" charset="0"/>
+              </a:rPr>
+              <a:t>}</a:t>
+            </a:r>
+            <a:r>
+              <a:rPr lang="en-US" dirty="0"/>
+              <a:t>: 	between n and m</a:t>
             </a:r>
           </a:p>
         </p:txBody>
@@ -7388,7 +7256,7 @@
     </p:spTree>
     <p:extLst>
       <p:ext uri="{BB962C8B-B14F-4D97-AF65-F5344CB8AC3E}">
-        <p14:creationId xmlns:p14="http://schemas.microsoft.com/office/powerpoint/2010/main" val="155095950"/>
+        <p14:creationId xmlns:p14="http://schemas.microsoft.com/office/powerpoint/2010/main" val="4149880424"/>
       </p:ext>
     </p:extLst>
   </p:cSld>
@@ -7837,7 +7705,7 @@
           <a:p>
             <a:r>
               <a:rPr lang="en-US" dirty="0"/>
-              <a:t>Regular expressions</a:t>
+              <a:t>Data processing &amp; cleaning</a:t>
             </a:r>
           </a:p>
           <a:p>
@@ -7849,8 +7717,11 @@
           <a:p>
             <a:r>
               <a:rPr lang="en-US" dirty="0"/>
-              <a:t>Data processing &amp; cleaning</a:t>
-            </a:r>
+              <a:t>Regular expressions</a:t>
+            </a:r>
+          </a:p>
+          <a:p>
+            <a:endParaRPr lang="en-US" dirty="0"/>
           </a:p>
         </p:txBody>
       </p:sp>
@@ -7963,13 +7834,7 @@
           <a:p>
             <a:pPr lvl="1"/>
             <a:r>
-              <a:rPr lang="en-US" dirty="0">
-                <a:solidFill>
-                  <a:schemeClr val="bg1">
-                    <a:lumMod val="75000"/>
-                  </a:schemeClr>
-                </a:solidFill>
-              </a:rPr>
+              <a:rPr lang="en-US" dirty="0"/>
               <a:t>Grouping</a:t>
             </a:r>
           </a:p>
@@ -7978,9 +7843,7 @@
             <a:r>
               <a:rPr lang="en-US" dirty="0">
                 <a:solidFill>
-                  <a:schemeClr val="bg1">
-                    <a:lumMod val="75000"/>
-                  </a:schemeClr>
+                  <a:srgbClr val="A3ADB7"/>
                 </a:solidFill>
               </a:rPr>
               <a:t>Anchors</a:t>
@@ -7989,9 +7852,14 @@
           <a:p>
             <a:pPr lvl="1"/>
             <a:r>
-              <a:rPr lang="en-US" dirty="0"/>
+              <a:rPr lang="en-US" dirty="0">
+                <a:solidFill>
+                  <a:srgbClr val="A3ADB7"/>
+                </a:solidFill>
+              </a:rPr>
               <a:t>Repetition</a:t>
             </a:r>
+            <a:endParaRPr lang="en-US" dirty="0"/>
           </a:p>
           <a:p>
             <a:pPr lvl="1"/>
@@ -8142,7 +8010,7 @@
         <p:spPr>
           <a:xfrm>
             <a:off x="5159896" y="2348880"/>
-            <a:ext cx="3744416" cy="2446824"/>
+            <a:ext cx="7200800" cy="1661993"/>
           </a:xfrm>
           <a:prstGeom prst="rect">
             <a:avLst/>
@@ -8156,133 +8024,267 @@
           <a:lstStyle/>
           <a:p>
             <a:r>
-              <a:rPr lang="en-US" dirty="0">
-                <a:latin typeface="+mj-lt"/>
-                <a:cs typeface="Consolas" panose="020B0609020204030204" pitchFamily="49" charset="0"/>
-              </a:rPr>
-              <a:t>Signs after an expression indicate how often it should or may appear.</a:t>
-            </a:r>
-          </a:p>
-          <a:p>
-            <a:endParaRPr lang="en-US" dirty="0">
-              <a:latin typeface="Consolas" panose="020B0609020204030204" pitchFamily="49" charset="0"/>
-              <a:cs typeface="Consolas" panose="020B0609020204030204" pitchFamily="49" charset="0"/>
-            </a:endParaRPr>
+              <a:rPr lang="en-US" dirty="0"/>
+              <a:t>Parentheses define a group</a:t>
+            </a:r>
           </a:p>
           <a:p>
             <a:pPr marL="285750" indent="-285750">
               <a:buFontTx/>
               <a:buChar char="-"/>
             </a:pPr>
-            <a:r>
-              <a:rPr lang="en-US" dirty="0">
-                <a:latin typeface="Consolas" panose="020B0609020204030204" pitchFamily="49" charset="0"/>
-                <a:cs typeface="Consolas" panose="020B0609020204030204" pitchFamily="49" charset="0"/>
-              </a:rPr>
-              <a:t>?</a:t>
-            </a:r>
-            <a:r>
-              <a:rPr lang="en-US" dirty="0"/>
-              <a:t>:		 0 or 1.</a:t>
-            </a:r>
-          </a:p>
-          <a:p>
-            <a:pPr marL="285750" indent="-285750">
-              <a:buFontTx/>
-              <a:buChar char="-"/>
-            </a:pPr>
-            <a:r>
-              <a:rPr lang="en-US" dirty="0">
-                <a:latin typeface="Consolas" panose="020B0609020204030204" pitchFamily="49" charset="0"/>
-                <a:cs typeface="Consolas" panose="020B0609020204030204" pitchFamily="49" charset="0"/>
-              </a:rPr>
-              <a:t>+</a:t>
-            </a:r>
-            <a:r>
-              <a:rPr lang="en-US" dirty="0"/>
-              <a:t>: 		1 or more.</a:t>
-            </a:r>
-          </a:p>
-          <a:p>
-            <a:pPr marL="285750" indent="-285750">
-              <a:buFontTx/>
-              <a:buChar char="-"/>
-            </a:pPr>
-            <a:r>
-              <a:rPr lang="en-US" dirty="0">
-                <a:latin typeface="Consolas" panose="020B0609020204030204" pitchFamily="49" charset="0"/>
-                <a:cs typeface="Consolas" panose="020B0609020204030204" pitchFamily="49" charset="0"/>
-              </a:rPr>
-              <a:t>*</a:t>
-            </a:r>
-            <a:r>
-              <a:rPr lang="en-US" dirty="0"/>
-              <a:t>: 		0 or more.</a:t>
-            </a:r>
-          </a:p>
-          <a:p>
-            <a:pPr marL="285750" indent="-285750">
-              <a:buFontTx/>
-              <a:buChar char="-"/>
-            </a:pPr>
-            <a:r>
-              <a:rPr lang="en-US" dirty="0">
-                <a:latin typeface="Consolas" panose="020B0609020204030204" pitchFamily="49" charset="0"/>
-                <a:cs typeface="Consolas" panose="020B0609020204030204" pitchFamily="49" charset="0"/>
-              </a:rPr>
-              <a:t>{n}</a:t>
-            </a:r>
-            <a:r>
-              <a:rPr lang="en-US" dirty="0"/>
-              <a:t>: 		exactly n</a:t>
-            </a:r>
-          </a:p>
-          <a:p>
-            <a:pPr marL="285750" indent="-285750">
-              <a:buFontTx/>
-              <a:buChar char="-"/>
-            </a:pPr>
-            <a:r>
-              <a:rPr lang="en-US" dirty="0">
-                <a:latin typeface="Consolas" panose="020B0609020204030204" pitchFamily="49" charset="0"/>
-                <a:cs typeface="Consolas" panose="020B0609020204030204" pitchFamily="49" charset="0"/>
-              </a:rPr>
-              <a:t>{n,}</a:t>
-            </a:r>
-            <a:r>
-              <a:rPr lang="en-US" dirty="0"/>
-              <a:t>: 		n or more</a:t>
-            </a:r>
-          </a:p>
-          <a:p>
-            <a:pPr marL="285750" indent="-285750">
-              <a:buFontTx/>
-              <a:buChar char="-"/>
-            </a:pPr>
-            <a:r>
-              <a:rPr lang="en-US" dirty="0">
-                <a:latin typeface="Consolas" panose="020B0609020204030204" pitchFamily="49" charset="0"/>
-                <a:cs typeface="Consolas" panose="020B0609020204030204" pitchFamily="49" charset="0"/>
-              </a:rPr>
-              <a:t>{</a:t>
+            <a:endParaRPr lang="en-US" dirty="0"/>
+          </a:p>
+          <a:p>
+            <a:r>
+              <a:rPr lang="en-US" dirty="0">
+                <a:solidFill>
+                  <a:srgbClr val="3353B7"/>
+                </a:solidFill>
+                <a:latin typeface="Consolas" panose="020B0609020204030204" pitchFamily="49" charset="0"/>
+                <a:cs typeface="Consolas" panose="020B0609020204030204" pitchFamily="49" charset="0"/>
+              </a:rPr>
+              <a:t>&gt; </a:t>
             </a:r>
             <a:r>
               <a:rPr lang="en-US" dirty="0" err="1">
-                <a:latin typeface="Consolas" panose="020B0609020204030204" pitchFamily="49" charset="0"/>
-                <a:cs typeface="Consolas" panose="020B0609020204030204" pitchFamily="49" charset="0"/>
-              </a:rPr>
-              <a:t>n,m</a:t>
-            </a:r>
-            <a:r>
-              <a:rPr lang="en-US" dirty="0">
-                <a:latin typeface="Consolas" panose="020B0609020204030204" pitchFamily="49" charset="0"/>
-                <a:cs typeface="Consolas" panose="020B0609020204030204" pitchFamily="49" charset="0"/>
-              </a:rPr>
-              <a:t>}</a:t>
-            </a:r>
-            <a:r>
-              <a:rPr lang="en-US" dirty="0"/>
-              <a:t>: 	between n and m</a:t>
+                <a:solidFill>
+                  <a:srgbClr val="3353B7"/>
+                </a:solidFill>
+                <a:latin typeface="Consolas" panose="020B0609020204030204" pitchFamily="49" charset="0"/>
+                <a:cs typeface="Consolas" panose="020B0609020204030204" pitchFamily="49" charset="0"/>
+              </a:rPr>
+              <a:t>str_extract</a:t>
+            </a:r>
+            <a:r>
+              <a:rPr lang="en-US" dirty="0">
+                <a:solidFill>
+                  <a:srgbClr val="3353B7"/>
+                </a:solidFill>
+                <a:latin typeface="Consolas" panose="020B0609020204030204" pitchFamily="49" charset="0"/>
+                <a:cs typeface="Consolas" panose="020B0609020204030204" pitchFamily="49" charset="0"/>
+              </a:rPr>
+              <a:t>(c("</a:t>
+            </a:r>
+            <a:r>
+              <a:rPr lang="en-US" dirty="0">
+                <a:solidFill>
+                  <a:schemeClr val="accent6">
+                    <a:lumMod val="50000"/>
+                  </a:schemeClr>
+                </a:solidFill>
+                <a:latin typeface="Consolas" panose="020B0609020204030204" pitchFamily="49" charset="0"/>
+                <a:cs typeface="Consolas" panose="020B0609020204030204" pitchFamily="49" charset="0"/>
+              </a:rPr>
+              <a:t>grey</a:t>
+            </a:r>
+            <a:r>
+              <a:rPr lang="en-US" dirty="0">
+                <a:solidFill>
+                  <a:srgbClr val="3353B7"/>
+                </a:solidFill>
+                <a:latin typeface="Consolas" panose="020B0609020204030204" pitchFamily="49" charset="0"/>
+                <a:cs typeface="Consolas" panose="020B0609020204030204" pitchFamily="49" charset="0"/>
+              </a:rPr>
+              <a:t>", "</a:t>
+            </a:r>
+            <a:r>
+              <a:rPr lang="en-US" dirty="0">
+                <a:solidFill>
+                  <a:schemeClr val="accent6">
+                    <a:lumMod val="50000"/>
+                  </a:schemeClr>
+                </a:solidFill>
+                <a:latin typeface="Consolas" panose="020B0609020204030204" pitchFamily="49" charset="0"/>
+                <a:cs typeface="Consolas" panose="020B0609020204030204" pitchFamily="49" charset="0"/>
+              </a:rPr>
+              <a:t>gray</a:t>
+            </a:r>
+            <a:r>
+              <a:rPr lang="en-US" dirty="0">
+                <a:solidFill>
+                  <a:srgbClr val="3353B7"/>
+                </a:solidFill>
+                <a:latin typeface="Consolas" panose="020B0609020204030204" pitchFamily="49" charset="0"/>
+                <a:cs typeface="Consolas" panose="020B0609020204030204" pitchFamily="49" charset="0"/>
+              </a:rPr>
+              <a:t>"), "</a:t>
+            </a:r>
+            <a:r>
+              <a:rPr lang="en-US" dirty="0" err="1">
+                <a:solidFill>
+                  <a:schemeClr val="accent6">
+                    <a:lumMod val="50000"/>
+                  </a:schemeClr>
+                </a:solidFill>
+                <a:latin typeface="Consolas" panose="020B0609020204030204" pitchFamily="49" charset="0"/>
+                <a:cs typeface="Consolas" panose="020B0609020204030204" pitchFamily="49" charset="0"/>
+              </a:rPr>
+              <a:t>gre|ay</a:t>
+            </a:r>
+            <a:r>
+              <a:rPr lang="en-US" dirty="0">
+                <a:solidFill>
+                  <a:srgbClr val="3353B7"/>
+                </a:solidFill>
+                <a:latin typeface="Consolas" panose="020B0609020204030204" pitchFamily="49" charset="0"/>
+                <a:cs typeface="Consolas" panose="020B0609020204030204" pitchFamily="49" charset="0"/>
+              </a:rPr>
+              <a:t>")</a:t>
+            </a:r>
+          </a:p>
+          <a:p>
+            <a:r>
+              <a:rPr lang="en-US" dirty="0">
+                <a:latin typeface="Consolas" panose="020B0609020204030204" pitchFamily="49" charset="0"/>
+                <a:cs typeface="Consolas" panose="020B0609020204030204" pitchFamily="49" charset="0"/>
+              </a:rPr>
+              <a:t>   "</a:t>
+            </a:r>
+            <a:r>
+              <a:rPr lang="en-US" dirty="0" err="1">
+                <a:latin typeface="Consolas" panose="020B0609020204030204" pitchFamily="49" charset="0"/>
+                <a:cs typeface="Consolas" panose="020B0609020204030204" pitchFamily="49" charset="0"/>
+              </a:rPr>
+              <a:t>gre</a:t>
+            </a:r>
+            <a:r>
+              <a:rPr lang="en-US" dirty="0">
+                <a:latin typeface="Consolas" panose="020B0609020204030204" pitchFamily="49" charset="0"/>
+                <a:cs typeface="Consolas" panose="020B0609020204030204" pitchFamily="49" charset="0"/>
+              </a:rPr>
+              <a:t>" "ay"</a:t>
+            </a:r>
+          </a:p>
+          <a:p>
+            <a:r>
+              <a:rPr lang="en-US" dirty="0">
+                <a:solidFill>
+                  <a:srgbClr val="3353B7"/>
+                </a:solidFill>
+                <a:latin typeface="Consolas" panose="020B0609020204030204" pitchFamily="49" charset="0"/>
+                <a:cs typeface="Consolas" panose="020B0609020204030204" pitchFamily="49" charset="0"/>
+              </a:rPr>
+              <a:t>&gt; </a:t>
+            </a:r>
+            <a:r>
+              <a:rPr lang="en-US" dirty="0" err="1">
+                <a:solidFill>
+                  <a:srgbClr val="3353B7"/>
+                </a:solidFill>
+                <a:latin typeface="Consolas" panose="020B0609020204030204" pitchFamily="49" charset="0"/>
+                <a:cs typeface="Consolas" panose="020B0609020204030204" pitchFamily="49" charset="0"/>
+              </a:rPr>
+              <a:t>str_extract</a:t>
+            </a:r>
+            <a:r>
+              <a:rPr lang="en-US" dirty="0">
+                <a:solidFill>
+                  <a:srgbClr val="3353B7"/>
+                </a:solidFill>
+                <a:latin typeface="Consolas" panose="020B0609020204030204" pitchFamily="49" charset="0"/>
+                <a:cs typeface="Consolas" panose="020B0609020204030204" pitchFamily="49" charset="0"/>
+              </a:rPr>
+              <a:t>(c("</a:t>
+            </a:r>
+            <a:r>
+              <a:rPr lang="en-US" dirty="0">
+                <a:solidFill>
+                  <a:schemeClr val="accent6">
+                    <a:lumMod val="50000"/>
+                  </a:schemeClr>
+                </a:solidFill>
+                <a:latin typeface="Consolas" panose="020B0609020204030204" pitchFamily="49" charset="0"/>
+                <a:cs typeface="Consolas" panose="020B0609020204030204" pitchFamily="49" charset="0"/>
+              </a:rPr>
+              <a:t>grey</a:t>
+            </a:r>
+            <a:r>
+              <a:rPr lang="en-US" dirty="0">
+                <a:solidFill>
+                  <a:srgbClr val="3353B7"/>
+                </a:solidFill>
+                <a:latin typeface="Consolas" panose="020B0609020204030204" pitchFamily="49" charset="0"/>
+                <a:cs typeface="Consolas" panose="020B0609020204030204" pitchFamily="49" charset="0"/>
+              </a:rPr>
+              <a:t>", "</a:t>
+            </a:r>
+            <a:r>
+              <a:rPr lang="en-US" dirty="0">
+                <a:solidFill>
+                  <a:schemeClr val="accent6">
+                    <a:lumMod val="50000"/>
+                  </a:schemeClr>
+                </a:solidFill>
+                <a:latin typeface="Consolas" panose="020B0609020204030204" pitchFamily="49" charset="0"/>
+                <a:cs typeface="Consolas" panose="020B0609020204030204" pitchFamily="49" charset="0"/>
+              </a:rPr>
+              <a:t>gray</a:t>
+            </a:r>
+            <a:r>
+              <a:rPr lang="en-US" dirty="0">
+                <a:solidFill>
+                  <a:srgbClr val="3353B7"/>
+                </a:solidFill>
+                <a:latin typeface="Consolas" panose="020B0609020204030204" pitchFamily="49" charset="0"/>
+                <a:cs typeface="Consolas" panose="020B0609020204030204" pitchFamily="49" charset="0"/>
+              </a:rPr>
+              <a:t>"), "</a:t>
+            </a:r>
+            <a:r>
+              <a:rPr lang="en-US" dirty="0">
+                <a:solidFill>
+                  <a:schemeClr val="accent6">
+                    <a:lumMod val="50000"/>
+                  </a:schemeClr>
+                </a:solidFill>
+                <a:latin typeface="Consolas" panose="020B0609020204030204" pitchFamily="49" charset="0"/>
+                <a:cs typeface="Consolas" panose="020B0609020204030204" pitchFamily="49" charset="0"/>
+              </a:rPr>
+              <a:t>gr(</a:t>
+            </a:r>
+            <a:r>
+              <a:rPr lang="en-US" dirty="0" err="1">
+                <a:solidFill>
+                  <a:schemeClr val="accent6">
+                    <a:lumMod val="50000"/>
+                  </a:schemeClr>
+                </a:solidFill>
+                <a:latin typeface="Consolas" panose="020B0609020204030204" pitchFamily="49" charset="0"/>
+                <a:cs typeface="Consolas" panose="020B0609020204030204" pitchFamily="49" charset="0"/>
+              </a:rPr>
+              <a:t>e|a</a:t>
+            </a:r>
+            <a:r>
+              <a:rPr lang="en-US" dirty="0">
+                <a:solidFill>
+                  <a:schemeClr val="accent6">
+                    <a:lumMod val="50000"/>
+                  </a:schemeClr>
+                </a:solidFill>
+                <a:latin typeface="Consolas" panose="020B0609020204030204" pitchFamily="49" charset="0"/>
+                <a:cs typeface="Consolas" panose="020B0609020204030204" pitchFamily="49" charset="0"/>
+              </a:rPr>
+              <a:t>)y</a:t>
+            </a:r>
+            <a:r>
+              <a:rPr lang="en-US" dirty="0">
+                <a:solidFill>
+                  <a:srgbClr val="3353B7"/>
+                </a:solidFill>
+                <a:latin typeface="Consolas" panose="020B0609020204030204" pitchFamily="49" charset="0"/>
+                <a:cs typeface="Consolas" panose="020B0609020204030204" pitchFamily="49" charset="0"/>
+              </a:rPr>
+              <a:t>")</a:t>
+            </a:r>
+          </a:p>
+          <a:p>
+            <a:r>
+              <a:rPr lang="en-US" dirty="0">
+                <a:latin typeface="Consolas" panose="020B0609020204030204" pitchFamily="49" charset="0"/>
+                <a:cs typeface="Consolas" panose="020B0609020204030204" pitchFamily="49" charset="0"/>
+              </a:rPr>
+              <a:t>   "grey" "gray"</a:t>
             </a:r>
           </a:p>
         </p:txBody>
@@ -8290,7 +8292,7 @@
     </p:spTree>
     <p:extLst>
       <p:ext uri="{BB962C8B-B14F-4D97-AF65-F5344CB8AC3E}">
-        <p14:creationId xmlns:p14="http://schemas.microsoft.com/office/powerpoint/2010/main" val="4149880424"/>
+        <p14:creationId xmlns:p14="http://schemas.microsoft.com/office/powerpoint/2010/main" val="155095950"/>
       </p:ext>
     </p:extLst>
   </p:cSld>
@@ -8672,104 +8674,70 @@
             <a:pPr lvl="1"/>
             <a:r>
               <a:rPr lang="en-US" dirty="0"/>
-              <a:t>There are many packages suitable to load specific types of data into R:</a:t>
+              <a:t>Text can be used in many ways. Some examples:</a:t>
             </a:r>
           </a:p>
           <a:p>
             <a:pPr lvl="2"/>
             <a:r>
-              <a:rPr lang="en-US" b="1" dirty="0" err="1"/>
-              <a:t>jsonlite</a:t>
-            </a:r>
-            <a:r>
               <a:rPr lang="en-US" dirty="0"/>
-              <a:t>: for JSON data</a:t>
+              <a:t>Classification of social media accounts via their published comments</a:t>
             </a:r>
           </a:p>
           <a:p>
             <a:pPr lvl="2"/>
             <a:r>
-              <a:rPr lang="en-US" b="1" dirty="0"/>
-              <a:t>xml2</a:t>
-            </a:r>
-            <a:r>
               <a:rPr lang="en-US" dirty="0"/>
-              <a:t>: for XML data</a:t>
+              <a:t>Sentiment analyses of speeches</a:t>
             </a:r>
           </a:p>
           <a:p>
             <a:pPr lvl="2"/>
             <a:r>
-              <a:rPr lang="en-US" b="1" dirty="0" err="1"/>
-              <a:t>readr</a:t>
-            </a:r>
-            <a:r>
               <a:rPr lang="en-US" dirty="0"/>
-              <a:t>: for Text data</a:t>
+              <a:t>Usage of words development in news throughout the last decade</a:t>
             </a:r>
           </a:p>
           <a:p>
             <a:pPr lvl="2"/>
             <a:r>
-              <a:rPr lang="en-US" b="1" dirty="0"/>
-              <a:t>haven</a:t>
-            </a:r>
-            <a:r>
               <a:rPr lang="en-US" dirty="0"/>
-              <a:t>: for SPSS, SAS, Stata files</a:t>
+              <a:t>…</a:t>
             </a:r>
           </a:p>
           <a:p>
             <a:pPr lvl="2"/>
-            <a:r>
-              <a:rPr lang="en-US" b="1" dirty="0" err="1"/>
-              <a:t>readxl</a:t>
-            </a:r>
+            <a:endParaRPr lang="en-US" dirty="0"/>
+          </a:p>
+          <a:p>
+            <a:pPr lvl="1"/>
             <a:r>
               <a:rPr lang="en-US" dirty="0"/>
-              <a:t>: for Microsoft excel files (.</a:t>
-            </a:r>
-            <a:r>
-              <a:rPr lang="en-US" dirty="0" err="1"/>
-              <a:t>xls</a:t>
-            </a:r>
+              <a:t>To do so, we need to be able to clean text or e.g. count words in a text.</a:t>
+            </a:r>
+          </a:p>
+          <a:p>
+            <a:pPr lvl="1"/>
             <a:r>
               <a:rPr lang="en-US" dirty="0"/>
-              <a:t> or .xlsx)</a:t>
-            </a:r>
-          </a:p>
-          <a:p>
-            <a:pPr lvl="2"/>
-            <a:r>
-              <a:rPr lang="en-US" b="1" dirty="0"/>
-              <a:t>DBI</a:t>
-            </a:r>
+              <a:t>Common cleaning steps are e.g. the removal of stop words, the stemming of words, or the summarization to word embeddings.</a:t>
+            </a:r>
+          </a:p>
+          <a:p>
+            <a:pPr lvl="1"/>
             <a:r>
               <a:rPr lang="en-US" dirty="0"/>
-              <a:t>: for connections to data bases</a:t>
-            </a:r>
-          </a:p>
-          <a:p>
-            <a:pPr lvl="2"/>
-            <a:r>
-              <a:rPr lang="en-US" b="1" dirty="0" err="1"/>
-              <a:t>httr</a:t>
-            </a:r>
-            <a:r>
-              <a:rPr lang="en-US" dirty="0"/>
-              <a:t>: to retrieve data from APIs</a:t>
-            </a:r>
-          </a:p>
-          <a:p>
-            <a:pPr lvl="2"/>
-            <a:r>
-              <a:rPr lang="en-US" b="1" dirty="0" err="1"/>
-              <a:t>rvest</a:t>
-            </a:r>
-            <a:r>
-              <a:rPr lang="en-US" dirty="0"/>
-              <a:t>: to retrieve data from websites/html</a:t>
-            </a:r>
+              <a:t>Next, we switch over to R to do some basic word extraction with </a:t>
+            </a:r>
+            <a:r>
+              <a:rPr lang="en-US"/>
+              <a:t>regular expressions.</a:t>
+            </a:r>
+            <a:endParaRPr lang="en-US" dirty="0"/>
+          </a:p>
+          <a:p>
+            <a:pPr lvl="1"/>
+            <a:endParaRPr lang="en-US" dirty="0"/>
           </a:p>
           <a:p>
             <a:pPr lvl="1"/>
@@ -8913,242 +8881,6 @@
     <p:extLst>
       <p:ext uri="{BB962C8B-B14F-4D97-AF65-F5344CB8AC3E}">
         <p14:creationId xmlns:p14="http://schemas.microsoft.com/office/powerpoint/2010/main" val="3514294626"/>
-      </p:ext>
-    </p:extLst>
-  </p:cSld>
-  <p:clrMapOvr>
-    <a:masterClrMapping/>
-  </p:clrMapOvr>
-</p:sld>
-</file>
-
-<file path=ppt/slides/slide24.xml><?xml version="1.0" encoding="utf-8"?>
-<p:sld xmlns:a="http://schemas.openxmlformats.org/drawingml/2006/main" xmlns:r="http://schemas.openxmlformats.org/officeDocument/2006/relationships" xmlns:p="http://schemas.openxmlformats.org/presentationml/2006/main">
-  <p:cSld>
-    <p:spTree>
-      <p:nvGrpSpPr>
-        <p:cNvPr id="1" name=""/>
-        <p:cNvGrpSpPr/>
-        <p:nvPr/>
-      </p:nvGrpSpPr>
-      <p:grpSpPr>
-        <a:xfrm>
-          <a:off x="0" y="0"/>
-          <a:ext cx="0" cy="0"/>
-          <a:chOff x="0" y="0"/>
-          <a:chExt cx="0" cy="0"/>
-        </a:xfrm>
-      </p:grpSpPr>
-      <p:sp>
-        <p:nvSpPr>
-          <p:cNvPr id="2" name="Titel 1">
-            <a:extLst>
-              <a:ext uri="{FF2B5EF4-FFF2-40B4-BE49-F238E27FC236}">
-                <a16:creationId xmlns:a16="http://schemas.microsoft.com/office/drawing/2014/main" id="{338F186B-42FB-4377-9439-4BD4CD4D995F}"/>
-              </a:ext>
-            </a:extLst>
-          </p:cNvPr>
-          <p:cNvSpPr>
-            <a:spLocks noGrp="1"/>
-          </p:cNvSpPr>
-          <p:nvPr>
-            <p:ph type="title"/>
-          </p:nvPr>
-        </p:nvSpPr>
-        <p:spPr/>
-        <p:txBody>
-          <a:bodyPr/>
-          <a:lstStyle/>
-          <a:p>
-            <a:r>
-              <a:rPr lang="en-US" dirty="0"/>
-              <a:t>Text data</a:t>
-            </a:r>
-          </a:p>
-        </p:txBody>
-      </p:sp>
-      <p:sp>
-        <p:nvSpPr>
-          <p:cNvPr id="3" name="Inhaltsplatzhalter 2">
-            <a:extLst>
-              <a:ext uri="{FF2B5EF4-FFF2-40B4-BE49-F238E27FC236}">
-                <a16:creationId xmlns:a16="http://schemas.microsoft.com/office/drawing/2014/main" id="{6855CDB6-B6EF-4181-81B4-EE8AEF68E783}"/>
-              </a:ext>
-            </a:extLst>
-          </p:cNvPr>
-          <p:cNvSpPr>
-            <a:spLocks noGrp="1"/>
-          </p:cNvSpPr>
-          <p:nvPr>
-            <p:ph idx="1"/>
-          </p:nvPr>
-        </p:nvSpPr>
-        <p:spPr>
-          <a:xfrm>
-            <a:off x="911224" y="2205039"/>
-            <a:ext cx="10009311" cy="3887787"/>
-          </a:xfrm>
-        </p:spPr>
-        <p:txBody>
-          <a:bodyPr/>
-          <a:lstStyle/>
-          <a:p>
-            <a:pPr lvl="1"/>
-            <a:r>
-              <a:rPr lang="en-US" dirty="0"/>
-              <a:t>Next we switch to </a:t>
-            </a:r>
-            <a:r>
-              <a:rPr lang="en-US"/>
-              <a:t>R for </a:t>
-            </a:r>
-            <a:r>
-              <a:rPr lang="en-US" dirty="0"/>
-              <a:t>the second assignment.</a:t>
-            </a:r>
-          </a:p>
-          <a:p>
-            <a:pPr lvl="1"/>
-            <a:endParaRPr lang="en-US" dirty="0"/>
-          </a:p>
-          <a:p>
-            <a:pPr lvl="1"/>
-            <a:endParaRPr lang="en-US" dirty="0"/>
-          </a:p>
-        </p:txBody>
-      </p:sp>
-      <p:sp>
-        <p:nvSpPr>
-          <p:cNvPr id="5" name="Datumsplatzhalter 4">
-            <a:extLst>
-              <a:ext uri="{FF2B5EF4-FFF2-40B4-BE49-F238E27FC236}">
-                <a16:creationId xmlns:a16="http://schemas.microsoft.com/office/drawing/2014/main" id="{AF979624-E89D-4E82-AD6E-D6A59CDAE51C}"/>
-              </a:ext>
-            </a:extLst>
-          </p:cNvPr>
-          <p:cNvSpPr>
-            <a:spLocks noGrp="1"/>
-          </p:cNvSpPr>
-          <p:nvPr>
-            <p:ph type="dt" sz="half" idx="14"/>
-          </p:nvPr>
-        </p:nvSpPr>
-        <p:spPr/>
-        <p:txBody>
-          <a:bodyPr/>
-          <a:lstStyle/>
-          <a:p>
-            <a:r>
-              <a:rPr lang="en-US"/>
-              <a:t>16.6.2020</a:t>
-            </a:r>
-            <a:endParaRPr lang="en-US" dirty="0"/>
-          </a:p>
-        </p:txBody>
-      </p:sp>
-      <p:sp>
-        <p:nvSpPr>
-          <p:cNvPr id="6" name="Fußzeilenplatzhalter 5">
-            <a:extLst>
-              <a:ext uri="{FF2B5EF4-FFF2-40B4-BE49-F238E27FC236}">
-                <a16:creationId xmlns:a16="http://schemas.microsoft.com/office/drawing/2014/main" id="{6553E4A7-69F1-433C-967D-0C8254B4BD69}"/>
-              </a:ext>
-            </a:extLst>
-          </p:cNvPr>
-          <p:cNvSpPr>
-            <a:spLocks noGrp="1"/>
-          </p:cNvSpPr>
-          <p:nvPr>
-            <p:ph type="ftr" sz="quarter" idx="15"/>
-          </p:nvPr>
-        </p:nvSpPr>
-        <p:spPr/>
-        <p:txBody>
-          <a:bodyPr/>
-          <a:lstStyle/>
-          <a:p>
-            <a:r>
-              <a:rPr lang="en-US"/>
-              <a:t>Foundations of Data Science, Exercise 2</a:t>
-            </a:r>
-            <a:endParaRPr lang="en-US" dirty="0"/>
-          </a:p>
-        </p:txBody>
-      </p:sp>
-      <p:sp>
-        <p:nvSpPr>
-          <p:cNvPr id="7" name="Foliennummernplatzhalter 6">
-            <a:extLst>
-              <a:ext uri="{FF2B5EF4-FFF2-40B4-BE49-F238E27FC236}">
-                <a16:creationId xmlns:a16="http://schemas.microsoft.com/office/drawing/2014/main" id="{4D0B0E17-08EC-48AB-BF4C-F2B6AE2C7277}"/>
-              </a:ext>
-            </a:extLst>
-          </p:cNvPr>
-          <p:cNvSpPr>
-            <a:spLocks noGrp="1"/>
-          </p:cNvSpPr>
-          <p:nvPr>
-            <p:ph type="sldNum" sz="quarter" idx="16"/>
-          </p:nvPr>
-        </p:nvSpPr>
-        <p:spPr/>
-        <p:txBody>
-          <a:bodyPr/>
-          <a:lstStyle/>
-          <a:p>
-            <a:r>
-              <a:rPr lang="en-US"/>
-              <a:t>Page </a:t>
-            </a:r>
-            <a:fld id="{9D46F3A4-F478-9440-BC8E-B732027F4C86}" type="slidenum">
-              <a:rPr lang="en-US" smtClean="0"/>
-              <a:pPr/>
-              <a:t>24</a:t>
-            </a:fld>
-            <a:endParaRPr lang="en-US" dirty="0"/>
-          </a:p>
-        </p:txBody>
-      </p:sp>
-      <p:sp>
-        <p:nvSpPr>
-          <p:cNvPr id="10" name="Textfeld 9">
-            <a:extLst>
-              <a:ext uri="{FF2B5EF4-FFF2-40B4-BE49-F238E27FC236}">
-                <a16:creationId xmlns:a16="http://schemas.microsoft.com/office/drawing/2014/main" id="{7680E779-C42F-4C53-A5FD-FA3E067921E4}"/>
-              </a:ext>
-            </a:extLst>
-          </p:cNvPr>
-          <p:cNvSpPr txBox="1"/>
-          <p:nvPr/>
-        </p:nvSpPr>
-        <p:spPr>
-          <a:xfrm>
-            <a:off x="6084731" y="3252028"/>
-            <a:ext cx="5976664" cy="353943"/>
-          </a:xfrm>
-          <a:prstGeom prst="rect">
-            <a:avLst/>
-          </a:prstGeom>
-          <a:noFill/>
-        </p:spPr>
-        <p:txBody>
-          <a:bodyPr wrap="square" rtlCol="0">
-            <a:spAutoFit/>
-          </a:bodyPr>
-          <a:lstStyle/>
-          <a:p>
-            <a:pPr lvl="0" eaLnBrk="0" hangingPunct="0">
-              <a:buFontTx/>
-              <a:buChar char="•"/>
-            </a:pPr>
-            <a:endParaRPr lang="en-US" dirty="0"/>
-          </a:p>
-        </p:txBody>
-      </p:sp>
-    </p:spTree>
-    <p:extLst>
-      <p:ext uri="{BB962C8B-B14F-4D97-AF65-F5344CB8AC3E}">
-        <p14:creationId xmlns:p14="http://schemas.microsoft.com/office/powerpoint/2010/main" val="316236019"/>
       </p:ext>
     </p:extLst>
   </p:cSld>
@@ -11489,7 +11221,7 @@
         <a:effectLst/>
         <a:extLst>
           <a:ext uri="{AF507438-7753-43e0-B8FC-AC1667EBCBE1}">
-            <a14:hiddenEffects xmlns:a14="http://schemas.microsoft.com/office/drawing/2010/main" xmlns="">
+            <a14:hiddenEffects xmlns="" xmlns:a14="http://schemas.microsoft.com/office/drawing/2010/main">
               <a:effectLst>
                 <a:outerShdw blurRad="63500" dist="35921" dir="2700000" algn="ctr" rotWithShape="0">
                   <a:schemeClr val="bg2"/>
@@ -11564,7 +11296,7 @@
         <a:effectLst/>
         <a:extLst>
           <a:ext uri="{AF507438-7753-43e0-B8FC-AC1667EBCBE1}">
-            <a14:hiddenEffects xmlns:a14="http://schemas.microsoft.com/office/drawing/2010/main" xmlns="">
+            <a14:hiddenEffects xmlns="" xmlns:a14="http://schemas.microsoft.com/office/drawing/2010/main">
               <a:effectLst>
                 <a:outerShdw blurRad="63500" dist="35921" dir="2700000" algn="ctr" rotWithShape="0">
                   <a:schemeClr val="bg2"/>

</xml_diff>